<commit_message>
Cambios en el ppt de la app
</commit_message>
<xml_diff>
--- a/documentacion/HexactaLabs-ExplicacionApp.pptx
+++ b/documentacion/HexactaLabs-ExplicacionApp.pptx
@@ -1037,51 +1037,6 @@
         </a:p>
       </dgm:t>
     </dgm:pt>
-    <dgm:pt modelId="{0764DABC-4988-4E83-9D27-6C612E2653B9}">
-      <dgm:prSet phldrT="[Text]"/>
-      <dgm:spPr/>
-      <dgm:t>
-        <a:bodyPr/>
-        <a:lstStyle/>
-        <a:p>
-          <a:r>
-            <a:rPr lang="es-ES_tradnl" dirty="0" err="1" smtClean="0"/>
-            <a:t>BookRepository</a:t>
-          </a:r>
-          <a:endParaRPr lang="en-US" dirty="0"/>
-        </a:p>
-      </dgm:t>
-    </dgm:pt>
-    <dgm:pt modelId="{249F8ABC-18A8-43BD-9D5F-45C4BE804F85}" type="parTrans" cxnId="{73520E53-F4B6-4F1E-90B5-18C455DEAE0D}">
-      <dgm:prSet/>
-      <dgm:spPr/>
-      <dgm:t>
-        <a:bodyPr/>
-        <a:lstStyle/>
-        <a:p>
-          <a:endParaRPr lang="en-US"/>
-        </a:p>
-      </dgm:t>
-    </dgm:pt>
-    <dgm:pt modelId="{44E407CA-8519-439E-8A89-95F7E138FD9B}" type="sibTrans" cxnId="{73520E53-F4B6-4F1E-90B5-18C455DEAE0D}">
-      <dgm:prSet/>
-      <dgm:spPr/>
-      <dgm:t>
-        <a:bodyPr/>
-        <a:lstStyle/>
-        <a:p>
-          <a:r>
-            <a:rPr lang="es-ES_tradnl" dirty="0" err="1" smtClean="0"/>
-            <a:t>findAll</a:t>
-          </a:r>
-          <a:r>
-            <a:rPr lang="es-ES_tradnl" dirty="0" smtClean="0"/>
-            <a:t>()</a:t>
-          </a:r>
-          <a:endParaRPr lang="en-US" dirty="0"/>
-        </a:p>
-      </dgm:t>
-    </dgm:pt>
     <dgm:pt modelId="{84D5E899-B0A4-43A6-B223-6A74745C3DD0}">
       <dgm:prSet phldrT="[Text]"/>
       <dgm:spPr/>
@@ -1164,6 +1119,43 @@
         </a:p>
       </dgm:t>
     </dgm:pt>
+    <dgm:pt modelId="{ECCFBC50-B422-44F5-95B9-96A8B72F44BE}">
+      <dgm:prSet/>
+      <dgm:spPr/>
+      <dgm:t>
+        <a:bodyPr/>
+        <a:lstStyle/>
+        <a:p>
+          <a:r>
+            <a:rPr lang="es-ES_tradnl" smtClean="0"/>
+            <a:t>bookListPage.html</a:t>
+          </a:r>
+          <a:endParaRPr lang="en-US" dirty="0"/>
+        </a:p>
+      </dgm:t>
+    </dgm:pt>
+    <dgm:pt modelId="{FA82857D-AEFD-4CDC-B238-CC004C4BF5F8}" type="parTrans" cxnId="{4E2CF60F-ABD4-4B94-B2E5-7761BCB5C135}">
+      <dgm:prSet/>
+      <dgm:spPr/>
+      <dgm:t>
+        <a:bodyPr/>
+        <a:lstStyle/>
+        <a:p>
+          <a:endParaRPr lang="es-AR"/>
+        </a:p>
+      </dgm:t>
+    </dgm:pt>
+    <dgm:pt modelId="{E0DCF021-D436-4ECF-AD4B-048C8AB890B9}" type="sibTrans" cxnId="{4E2CF60F-ABD4-4B94-B2E5-7761BCB5C135}">
+      <dgm:prSet/>
+      <dgm:spPr/>
+      <dgm:t>
+        <a:bodyPr/>
+        <a:lstStyle/>
+        <a:p>
+          <a:endParaRPr lang="es-AR"/>
+        </a:p>
+      </dgm:t>
+    </dgm:pt>
     <dgm:pt modelId="{88052538-6CB1-4F7A-A301-649AE84EF66B}" type="pres">
       <dgm:prSet presAssocID="{F24FA211-3F2C-4346-ABD9-092692E7A9F4}" presName="diagram" presStyleCnt="0">
         <dgm:presLayoutVars>
@@ -1180,8 +1172,24 @@
         </a:p>
       </dgm:t>
     </dgm:pt>
+    <dgm:pt modelId="{843FDB59-0DC6-4D62-B43C-B7DF9A235BCB}" type="pres">
+      <dgm:prSet presAssocID="{ECCFBC50-B422-44F5-95B9-96A8B72F44BE}" presName="node" presStyleLbl="node1" presStyleIdx="0" presStyleCnt="6" custScaleY="40183" custLinFactNeighborX="-92959" custLinFactNeighborY="1149">
+        <dgm:presLayoutVars>
+          <dgm:bulletEnabled val="1"/>
+        </dgm:presLayoutVars>
+      </dgm:prSet>
+      <dgm:spPr/>
+    </dgm:pt>
+    <dgm:pt modelId="{EC4F7D31-55FD-4683-A45C-740459EB442A}" type="pres">
+      <dgm:prSet presAssocID="{E0DCF021-D436-4ECF-AD4B-048C8AB890B9}" presName="sibTrans" presStyleLbl="sibTrans2D1" presStyleIdx="0" presStyleCnt="5" custScaleY="57820"/>
+      <dgm:spPr/>
+    </dgm:pt>
+    <dgm:pt modelId="{E8880981-8A6D-4797-BEC7-23DD04C9F5DD}" type="pres">
+      <dgm:prSet presAssocID="{E0DCF021-D436-4ECF-AD4B-048C8AB890B9}" presName="connectorText" presStyleLbl="sibTrans2D1" presStyleIdx="0" presStyleCnt="5"/>
+      <dgm:spPr/>
+    </dgm:pt>
     <dgm:pt modelId="{F680135F-FB83-4C06-91FC-3A29DC63396C}" type="pres">
-      <dgm:prSet presAssocID="{4B3393CD-BE25-4520-B303-8BAD23F50CE0}" presName="node" presStyleLbl="node1" presStyleIdx="0" presStyleCnt="6" custScaleX="79737" custScaleY="44689" custLinFactX="-6246" custLinFactNeighborX="-100000" custLinFactNeighborY="-39224">
+      <dgm:prSet presAssocID="{4B3393CD-BE25-4520-B303-8BAD23F50CE0}" presName="node" presStyleLbl="node1" presStyleIdx="1" presStyleCnt="6" custScaleX="79737" custScaleY="44689" custLinFactNeighborX="563" custLinFactNeighborY="2823">
         <dgm:presLayoutVars>
           <dgm:bulletEnabled val="1"/>
         </dgm:presLayoutVars>
@@ -1196,7 +1204,7 @@
       </dgm:t>
     </dgm:pt>
     <dgm:pt modelId="{00C08AC9-1D4E-4798-A062-2CC79FC0B56F}" type="pres">
-      <dgm:prSet presAssocID="{3B76D8E7-67CF-4CB2-BF09-7B700E7E5D12}" presName="sibTrans" presStyleLbl="sibTrans2D1" presStyleIdx="0" presStyleCnt="5" custScaleX="169362" custScaleY="68547" custLinFactNeighborX="4540" custLinFactNeighborY="3481"/>
+      <dgm:prSet presAssocID="{3B76D8E7-67CF-4CB2-BF09-7B700E7E5D12}" presName="sibTrans" presStyleLbl="sibTrans2D1" presStyleIdx="1" presStyleCnt="5" custScaleX="169362" custScaleY="68547" custLinFactNeighborX="4540" custLinFactNeighborY="3481"/>
       <dgm:spPr/>
       <dgm:t>
         <a:bodyPr/>
@@ -1207,7 +1215,7 @@
       </dgm:t>
     </dgm:pt>
     <dgm:pt modelId="{79A966BC-6822-4F1F-8DDB-931C03225B4B}" type="pres">
-      <dgm:prSet presAssocID="{3B76D8E7-67CF-4CB2-BF09-7B700E7E5D12}" presName="connectorText" presStyleLbl="sibTrans2D1" presStyleIdx="0" presStyleCnt="5"/>
+      <dgm:prSet presAssocID="{3B76D8E7-67CF-4CB2-BF09-7B700E7E5D12}" presName="connectorText" presStyleLbl="sibTrans2D1" presStyleIdx="1" presStyleCnt="5"/>
       <dgm:spPr/>
       <dgm:t>
         <a:bodyPr/>
@@ -1218,7 +1226,7 @@
       </dgm:t>
     </dgm:pt>
     <dgm:pt modelId="{BC696920-5112-47F6-BE4D-E1EB1973835F}" type="pres">
-      <dgm:prSet presAssocID="{7703AC7D-7627-48AA-BF50-1DEDC16D7D91}" presName="node" presStyleLbl="node1" presStyleIdx="1" presStyleCnt="6" custScaleX="78572" custScaleY="41477" custLinFactX="21678" custLinFactNeighborX="100000" custLinFactNeighborY="-42614">
+      <dgm:prSet presAssocID="{7703AC7D-7627-48AA-BF50-1DEDC16D7D91}" presName="node" presStyleLbl="node1" presStyleIdx="2" presStyleCnt="6" custScaleX="78572" custScaleY="41477" custLinFactX="-100000" custLinFactNeighborX="-127035" custLinFactNeighborY="6033">
         <dgm:presLayoutVars>
           <dgm:bulletEnabled val="1"/>
         </dgm:presLayoutVars>
@@ -1233,7 +1241,7 @@
       </dgm:t>
     </dgm:pt>
     <dgm:pt modelId="{914B1954-7982-4DED-A8D5-5875C703DF93}" type="pres">
-      <dgm:prSet presAssocID="{034CED5B-B964-4238-86DE-9425E8ACB288}" presName="sibTrans" presStyleLbl="sibTrans2D1" presStyleIdx="1" presStyleCnt="5" custScaleX="173738" custScaleY="62229" custLinFactNeighborX="-6641" custLinFactNeighborY="20558"/>
+      <dgm:prSet presAssocID="{034CED5B-B964-4238-86DE-9425E8ACB288}" presName="sibTrans" presStyleLbl="sibTrans2D1" presStyleIdx="2" presStyleCnt="5" custScaleX="156976" custScaleY="62229" custLinFactNeighborX="-6641" custLinFactNeighborY="20558"/>
       <dgm:spPr/>
       <dgm:t>
         <a:bodyPr/>
@@ -1244,7 +1252,7 @@
       </dgm:t>
     </dgm:pt>
     <dgm:pt modelId="{4E7053E0-5968-423E-9BAF-BE0FE864C6C7}" type="pres">
-      <dgm:prSet presAssocID="{034CED5B-B964-4238-86DE-9425E8ACB288}" presName="connectorText" presStyleLbl="sibTrans2D1" presStyleIdx="1" presStyleCnt="5"/>
+      <dgm:prSet presAssocID="{034CED5B-B964-4238-86DE-9425E8ACB288}" presName="connectorText" presStyleLbl="sibTrans2D1" presStyleIdx="2" presStyleCnt="5"/>
       <dgm:spPr/>
       <dgm:t>
         <a:bodyPr/>
@@ -1255,7 +1263,7 @@
       </dgm:t>
     </dgm:pt>
     <dgm:pt modelId="{5866D430-EA1C-4910-9534-06E6848714EB}" type="pres">
-      <dgm:prSet presAssocID="{16DD3F1C-A6F8-47D3-BA57-675D1A413B75}" presName="node" presStyleLbl="node1" presStyleIdx="2" presStyleCnt="6" custScaleX="81665" custScaleY="54484" custLinFactX="-100000" custLinFactNeighborX="-138322" custLinFactNeighborY="43563">
+      <dgm:prSet presAssocID="{16DD3F1C-A6F8-47D3-BA57-675D1A413B75}" presName="node" presStyleLbl="node1" presStyleIdx="3" presStyleCnt="6" custScaleX="81665" custScaleY="54484" custLinFactX="43905" custLinFactNeighborX="100000" custLinFactNeighborY="3452">
         <dgm:presLayoutVars>
           <dgm:bulletEnabled val="1"/>
         </dgm:presLayoutVars>
@@ -1270,7 +1278,7 @@
       </dgm:t>
     </dgm:pt>
     <dgm:pt modelId="{3C1528C3-2A53-4665-B9B1-9D10BDE5246C}" type="pres">
-      <dgm:prSet presAssocID="{131BA167-16C8-427D-BB30-8989EA4E70E5}" presName="sibTrans" presStyleLbl="sibTrans2D1" presStyleIdx="2" presStyleCnt="5" custScaleX="148833" custScaleY="57210" custLinFactNeighborX="1129" custLinFactNeighborY="25007"/>
+      <dgm:prSet presAssocID="{131BA167-16C8-427D-BB30-8989EA4E70E5}" presName="sibTrans" presStyleLbl="sibTrans2D1" presStyleIdx="3" presStyleCnt="5" custScaleX="148833" custScaleY="57210" custLinFactNeighborX="1129" custLinFactNeighborY="25007"/>
       <dgm:spPr/>
       <dgm:t>
         <a:bodyPr/>
@@ -1281,44 +1289,7 @@
       </dgm:t>
     </dgm:pt>
     <dgm:pt modelId="{9834EF4A-D85A-496C-B5F4-813700D1B355}" type="pres">
-      <dgm:prSet presAssocID="{131BA167-16C8-427D-BB30-8989EA4E70E5}" presName="connectorText" presStyleLbl="sibTrans2D1" presStyleIdx="2" presStyleCnt="5"/>
-      <dgm:spPr/>
-      <dgm:t>
-        <a:bodyPr/>
-        <a:lstStyle/>
-        <a:p>
-          <a:endParaRPr lang="en-US"/>
-        </a:p>
-      </dgm:t>
-    </dgm:pt>
-    <dgm:pt modelId="{9345B24A-55DC-4164-8C82-526C07E03E06}" type="pres">
-      <dgm:prSet presAssocID="{0764DABC-4988-4E83-9D27-6C612E2653B9}" presName="node" presStyleLbl="node1" presStyleIdx="3" presStyleCnt="6" custScaleX="77454" custScaleY="53377" custLinFactNeighborX="13" custLinFactNeighborY="-88204">
-        <dgm:presLayoutVars>
-          <dgm:bulletEnabled val="1"/>
-        </dgm:presLayoutVars>
-      </dgm:prSet>
-      <dgm:spPr/>
-      <dgm:t>
-        <a:bodyPr/>
-        <a:lstStyle/>
-        <a:p>
-          <a:endParaRPr lang="en-US"/>
-        </a:p>
-      </dgm:t>
-    </dgm:pt>
-    <dgm:pt modelId="{0F9723B7-0055-459E-A10D-E0CCDB016560}" type="pres">
-      <dgm:prSet presAssocID="{44E407CA-8519-439E-8A89-95F7E138FD9B}" presName="sibTrans" presStyleLbl="sibTrans2D1" presStyleIdx="3" presStyleCnt="5" custScaleX="167030" custScaleY="57996" custLinFactNeighborX="-1463" custLinFactNeighborY="26689"/>
-      <dgm:spPr/>
-      <dgm:t>
-        <a:bodyPr/>
-        <a:lstStyle/>
-        <a:p>
-          <a:endParaRPr lang="en-US"/>
-        </a:p>
-      </dgm:t>
-    </dgm:pt>
-    <dgm:pt modelId="{DF43D430-0F06-4181-9E7A-3A427B6E5D03}" type="pres">
-      <dgm:prSet presAssocID="{44E407CA-8519-439E-8A89-95F7E138FD9B}" presName="connectorText" presStyleLbl="sibTrans2D1" presStyleIdx="3" presStyleCnt="5"/>
+      <dgm:prSet presAssocID="{131BA167-16C8-427D-BB30-8989EA4E70E5}" presName="connectorText" presStyleLbl="sibTrans2D1" presStyleIdx="3" presStyleCnt="5"/>
       <dgm:spPr/>
       <dgm:t>
         <a:bodyPr/>
@@ -1329,7 +1300,7 @@
       </dgm:t>
     </dgm:pt>
     <dgm:pt modelId="{7490BDB8-F1E2-4EB2-82E7-C08F9B9E534E}" type="pres">
-      <dgm:prSet presAssocID="{84D5E899-B0A4-43A6-B223-6A74745C3DD0}" presName="node" presStyleLbl="node1" presStyleIdx="4" presStyleCnt="6" custScaleX="75823" custScaleY="41433" custLinFactX="-26710" custLinFactNeighborX="-100000" custLinFactNeighborY="703">
+      <dgm:prSet presAssocID="{84D5E899-B0A4-43A6-B223-6A74745C3DD0}" presName="node" presStyleLbl="node1" presStyleIdx="4" presStyleCnt="6" custScaleX="75823" custScaleY="41433" custLinFactY="12222" custLinFactNeighborX="6468" custLinFactNeighborY="100000">
         <dgm:presLayoutVars>
           <dgm:bulletEnabled val="1"/>
         </dgm:presLayoutVars>
@@ -1366,7 +1337,7 @@
       </dgm:t>
     </dgm:pt>
     <dgm:pt modelId="{E8D2FA06-B903-4014-BFD9-BFAEAA6FFFAA}" type="pres">
-      <dgm:prSet presAssocID="{E14C6B11-9E69-4BC7-AEE0-6EC9CF20AF87}" presName="node" presStyleLbl="node1" presStyleIdx="5" presStyleCnt="6" custScaleX="77535" custScaleY="51332" custLinFactX="100000" custLinFactNeighborX="132527" custLinFactNeighborY="-3566">
+      <dgm:prSet presAssocID="{E14C6B11-9E69-4BC7-AEE0-6EC9CF20AF87}" presName="node" presStyleLbl="node1" presStyleIdx="5" presStyleCnt="6" custScaleX="77535" custScaleY="51332" custLinFactX="100000" custLinFactNeighborX="135144" custLinFactNeighborY="-5114">
         <dgm:presLayoutVars>
           <dgm:bulletEnabled val="1"/>
         </dgm:presLayoutVars>
@@ -1382,41 +1353,41 @@
     </dgm:pt>
   </dgm:ptLst>
   <dgm:cxnLst>
+    <dgm:cxn modelId="{7088EC34-C1BA-48B0-B058-0B664C09D58A}" srcId="{F24FA211-3F2C-4346-ABD9-092692E7A9F4}" destId="{7703AC7D-7627-48AA-BF50-1DEDC16D7D91}" srcOrd="2" destOrd="0" parTransId="{3CBB70BA-78E8-45DC-81B2-4BEEC48E7B7D}" sibTransId="{034CED5B-B964-4238-86DE-9425E8ACB288}"/>
+    <dgm:cxn modelId="{6B61CD25-7CFE-46EB-BAFE-AA0770C80DF0}" type="presOf" srcId="{16DD3F1C-A6F8-47D3-BA57-675D1A413B75}" destId="{5866D430-EA1C-4910-9534-06E6848714EB}" srcOrd="0" destOrd="0" presId="urn:microsoft.com/office/officeart/2005/8/layout/process5"/>
+    <dgm:cxn modelId="{F7CC6D26-AE79-42FF-99C9-C166EB62A420}" type="presOf" srcId="{3B76D8E7-67CF-4CB2-BF09-7B700E7E5D12}" destId="{79A966BC-6822-4F1F-8DDB-931C03225B4B}" srcOrd="1" destOrd="0" presId="urn:microsoft.com/office/officeart/2005/8/layout/process5"/>
+    <dgm:cxn modelId="{BFFDB2F1-E191-4C98-A9AD-D543A261E230}" type="presOf" srcId="{3B76D8E7-67CF-4CB2-BF09-7B700E7E5D12}" destId="{00C08AC9-1D4E-4798-A062-2CC79FC0B56F}" srcOrd="0" destOrd="0" presId="urn:microsoft.com/office/officeart/2005/8/layout/process5"/>
+    <dgm:cxn modelId="{7EA0BF71-6309-4460-82DA-35435673EC0C}" type="presOf" srcId="{F24FA211-3F2C-4346-ABD9-092692E7A9F4}" destId="{88052538-6CB1-4F7A-A301-649AE84EF66B}" srcOrd="0" destOrd="0" presId="urn:microsoft.com/office/officeart/2005/8/layout/process5"/>
+    <dgm:cxn modelId="{E3B95932-202A-452F-87CE-D87CC64E5C56}" type="presOf" srcId="{E0DCF021-D436-4ECF-AD4B-048C8AB890B9}" destId="{E8880981-8A6D-4797-BEC7-23DD04C9F5DD}" srcOrd="1" destOrd="0" presId="urn:microsoft.com/office/officeart/2005/8/layout/process5"/>
+    <dgm:cxn modelId="{D9343D1D-D2F9-4D8F-83C9-6CE85AE1227E}" type="presOf" srcId="{131BA167-16C8-427D-BB30-8989EA4E70E5}" destId="{9834EF4A-D85A-496C-B5F4-813700D1B355}" srcOrd="1" destOrd="0" presId="urn:microsoft.com/office/officeart/2005/8/layout/process5"/>
+    <dgm:cxn modelId="{E6D727F8-C9FE-4B4E-B5E5-A87BCB3EE519}" type="presOf" srcId="{895E128C-A5F0-4683-B3D9-17A5C3B0BD55}" destId="{1FD05E88-9E09-4F15-B0F4-DD6A84F91FB2}" srcOrd="0" destOrd="0" presId="urn:microsoft.com/office/officeart/2005/8/layout/process5"/>
+    <dgm:cxn modelId="{C3861FA4-D69B-4D5F-9E76-323ACFF87FEC}" srcId="{F24FA211-3F2C-4346-ABD9-092692E7A9F4}" destId="{4B3393CD-BE25-4520-B303-8BAD23F50CE0}" srcOrd="1" destOrd="0" parTransId="{9BF9F86E-19D0-4D46-B788-9E0D0EE490C8}" sibTransId="{3B76D8E7-67CF-4CB2-BF09-7B700E7E5D12}"/>
+    <dgm:cxn modelId="{B72DAA64-6526-4D3B-A21C-06A3DE2410CA}" type="presOf" srcId="{034CED5B-B964-4238-86DE-9425E8ACB288}" destId="{914B1954-7982-4DED-A8D5-5875C703DF93}" srcOrd="0" destOrd="0" presId="urn:microsoft.com/office/officeart/2005/8/layout/process5"/>
+    <dgm:cxn modelId="{439C8EB0-45C9-4AC8-9065-6798C70D0210}" type="presOf" srcId="{895E128C-A5F0-4683-B3D9-17A5C3B0BD55}" destId="{60429F7C-10D0-4D3F-8019-997E2BE29191}" srcOrd="1" destOrd="0" presId="urn:microsoft.com/office/officeart/2005/8/layout/process5"/>
+    <dgm:cxn modelId="{4E2CF60F-ABD4-4B94-B2E5-7761BCB5C135}" srcId="{F24FA211-3F2C-4346-ABD9-092692E7A9F4}" destId="{ECCFBC50-B422-44F5-95B9-96A8B72F44BE}" srcOrd="0" destOrd="0" parTransId="{FA82857D-AEFD-4CDC-B238-CC004C4BF5F8}" sibTransId="{E0DCF021-D436-4ECF-AD4B-048C8AB890B9}"/>
+    <dgm:cxn modelId="{1C0486F3-B9B1-443C-968E-B0D4715D1C82}" type="presOf" srcId="{ECCFBC50-B422-44F5-95B9-96A8B72F44BE}" destId="{843FDB59-0DC6-4D62-B43C-B7DF9A235BCB}" srcOrd="0" destOrd="0" presId="urn:microsoft.com/office/officeart/2005/8/layout/process5"/>
+    <dgm:cxn modelId="{CF687D50-6AB4-40BE-A827-04660403E62F}" type="presOf" srcId="{131BA167-16C8-427D-BB30-8989EA4E70E5}" destId="{3C1528C3-2A53-4665-B9B1-9D10BDE5246C}" srcOrd="0" destOrd="0" presId="urn:microsoft.com/office/officeart/2005/8/layout/process5"/>
+    <dgm:cxn modelId="{9F09F7B6-85E5-4228-B4F0-693ACBB95191}" type="presOf" srcId="{4B3393CD-BE25-4520-B303-8BAD23F50CE0}" destId="{F680135F-FB83-4C06-91FC-3A29DC63396C}" srcOrd="0" destOrd="0" presId="urn:microsoft.com/office/officeart/2005/8/layout/process5"/>
+    <dgm:cxn modelId="{02E9D015-F6EE-4AF4-95B7-0A935201365C}" type="presOf" srcId="{E0DCF021-D436-4ECF-AD4B-048C8AB890B9}" destId="{EC4F7D31-55FD-4683-A45C-740459EB442A}" srcOrd="0" destOrd="0" presId="urn:microsoft.com/office/officeart/2005/8/layout/process5"/>
+    <dgm:cxn modelId="{A0C4E794-B7CC-4EBD-B60A-7155768F82BA}" type="presOf" srcId="{84D5E899-B0A4-43A6-B223-6A74745C3DD0}" destId="{7490BDB8-F1E2-4EB2-82E7-C08F9B9E534E}" srcOrd="0" destOrd="0" presId="urn:microsoft.com/office/officeart/2005/8/layout/process5"/>
+    <dgm:cxn modelId="{D8A00F18-C6DD-4134-9099-FA2865724BC5}" srcId="{F24FA211-3F2C-4346-ABD9-092692E7A9F4}" destId="{E14C6B11-9E69-4BC7-AEE0-6EC9CF20AF87}" srcOrd="5" destOrd="0" parTransId="{5C923AB1-59F2-4986-B504-004979660F31}" sibTransId="{72B24B98-2746-4468-853D-85A0838FF80C}"/>
+    <dgm:cxn modelId="{8ABA0D0D-03E5-4296-9634-39F1977DCD09}" type="presOf" srcId="{034CED5B-B964-4238-86DE-9425E8ACB288}" destId="{4E7053E0-5968-423E-9BAF-BE0FE864C6C7}" srcOrd="1" destOrd="0" presId="urn:microsoft.com/office/officeart/2005/8/layout/process5"/>
+    <dgm:cxn modelId="{62776DAB-A42C-41F2-A0ED-4C3D264A087C}" type="presOf" srcId="{E14C6B11-9E69-4BC7-AEE0-6EC9CF20AF87}" destId="{E8D2FA06-B903-4014-BFD9-BFAEAA6FFFAA}" srcOrd="0" destOrd="0" presId="urn:microsoft.com/office/officeart/2005/8/layout/process5"/>
     <dgm:cxn modelId="{49753BEA-9113-42EB-9851-5BCFD553BE86}" srcId="{F24FA211-3F2C-4346-ABD9-092692E7A9F4}" destId="{84D5E899-B0A4-43A6-B223-6A74745C3DD0}" srcOrd="4" destOrd="0" parTransId="{0403FFE2-9798-490A-9583-C4C77117D92C}" sibTransId="{895E128C-A5F0-4683-B3D9-17A5C3B0BD55}"/>
-    <dgm:cxn modelId="{9F09F7B6-85E5-4228-B4F0-693ACBB95191}" type="presOf" srcId="{4B3393CD-BE25-4520-B303-8BAD23F50CE0}" destId="{F680135F-FB83-4C06-91FC-3A29DC63396C}" srcOrd="0" destOrd="0" presId="urn:microsoft.com/office/officeart/2005/8/layout/process5"/>
-    <dgm:cxn modelId="{7088EC34-C1BA-48B0-B058-0B664C09D58A}" srcId="{F24FA211-3F2C-4346-ABD9-092692E7A9F4}" destId="{7703AC7D-7627-48AA-BF50-1DEDC16D7D91}" srcOrd="1" destOrd="0" parTransId="{3CBB70BA-78E8-45DC-81B2-4BEEC48E7B7D}" sibTransId="{034CED5B-B964-4238-86DE-9425E8ACB288}"/>
-    <dgm:cxn modelId="{A0C4E794-B7CC-4EBD-B60A-7155768F82BA}" type="presOf" srcId="{84D5E899-B0A4-43A6-B223-6A74745C3DD0}" destId="{7490BDB8-F1E2-4EB2-82E7-C08F9B9E534E}" srcOrd="0" destOrd="0" presId="urn:microsoft.com/office/officeart/2005/8/layout/process5"/>
-    <dgm:cxn modelId="{E6D727F8-C9FE-4B4E-B5E5-A87BCB3EE519}" type="presOf" srcId="{895E128C-A5F0-4683-B3D9-17A5C3B0BD55}" destId="{1FD05E88-9E09-4F15-B0F4-DD6A84F91FB2}" srcOrd="0" destOrd="0" presId="urn:microsoft.com/office/officeart/2005/8/layout/process5"/>
-    <dgm:cxn modelId="{7EA0BF71-6309-4460-82DA-35435673EC0C}" type="presOf" srcId="{F24FA211-3F2C-4346-ABD9-092692E7A9F4}" destId="{88052538-6CB1-4F7A-A301-649AE84EF66B}" srcOrd="0" destOrd="0" presId="urn:microsoft.com/office/officeart/2005/8/layout/process5"/>
-    <dgm:cxn modelId="{CF687D50-6AB4-40BE-A827-04660403E62F}" type="presOf" srcId="{131BA167-16C8-427D-BB30-8989EA4E70E5}" destId="{3C1528C3-2A53-4665-B9B1-9D10BDE5246C}" srcOrd="0" destOrd="0" presId="urn:microsoft.com/office/officeart/2005/8/layout/process5"/>
-    <dgm:cxn modelId="{E6DCC218-2905-492A-84FA-01987C14BCAB}" type="presOf" srcId="{0764DABC-4988-4E83-9D27-6C612E2653B9}" destId="{9345B24A-55DC-4164-8C82-526C07E03E06}" srcOrd="0" destOrd="0" presId="urn:microsoft.com/office/officeart/2005/8/layout/process5"/>
-    <dgm:cxn modelId="{D9343D1D-D2F9-4D8F-83C9-6CE85AE1227E}" type="presOf" srcId="{131BA167-16C8-427D-BB30-8989EA4E70E5}" destId="{9834EF4A-D85A-496C-B5F4-813700D1B355}" srcOrd="1" destOrd="0" presId="urn:microsoft.com/office/officeart/2005/8/layout/process5"/>
-    <dgm:cxn modelId="{8ABA0D0D-03E5-4296-9634-39F1977DCD09}" type="presOf" srcId="{034CED5B-B964-4238-86DE-9425E8ACB288}" destId="{4E7053E0-5968-423E-9BAF-BE0FE864C6C7}" srcOrd="1" destOrd="0" presId="urn:microsoft.com/office/officeart/2005/8/layout/process5"/>
-    <dgm:cxn modelId="{BFFDB2F1-E191-4C98-A9AD-D543A261E230}" type="presOf" srcId="{3B76D8E7-67CF-4CB2-BF09-7B700E7E5D12}" destId="{00C08AC9-1D4E-4798-A062-2CC79FC0B56F}" srcOrd="0" destOrd="0" presId="urn:microsoft.com/office/officeart/2005/8/layout/process5"/>
-    <dgm:cxn modelId="{6B61CD25-7CFE-46EB-BAFE-AA0770C80DF0}" type="presOf" srcId="{16DD3F1C-A6F8-47D3-BA57-675D1A413B75}" destId="{5866D430-EA1C-4910-9534-06E6848714EB}" srcOrd="0" destOrd="0" presId="urn:microsoft.com/office/officeart/2005/8/layout/process5"/>
-    <dgm:cxn modelId="{A4770200-C787-4EB5-9BAD-61E85C5E56D8}" type="presOf" srcId="{44E407CA-8519-439E-8A89-95F7E138FD9B}" destId="{DF43D430-0F06-4181-9E7A-3A427B6E5D03}" srcOrd="1" destOrd="0" presId="urn:microsoft.com/office/officeart/2005/8/layout/process5"/>
-    <dgm:cxn modelId="{73520E53-F4B6-4F1E-90B5-18C455DEAE0D}" srcId="{F24FA211-3F2C-4346-ABD9-092692E7A9F4}" destId="{0764DABC-4988-4E83-9D27-6C612E2653B9}" srcOrd="3" destOrd="0" parTransId="{249F8ABC-18A8-43BD-9D5F-45C4BE804F85}" sibTransId="{44E407CA-8519-439E-8A89-95F7E138FD9B}"/>
-    <dgm:cxn modelId="{439C8EB0-45C9-4AC8-9065-6798C70D0210}" type="presOf" srcId="{895E128C-A5F0-4683-B3D9-17A5C3B0BD55}" destId="{60429F7C-10D0-4D3F-8019-997E2BE29191}" srcOrd="1" destOrd="0" presId="urn:microsoft.com/office/officeart/2005/8/layout/process5"/>
-    <dgm:cxn modelId="{D8A00F18-C6DD-4134-9099-FA2865724BC5}" srcId="{F24FA211-3F2C-4346-ABD9-092692E7A9F4}" destId="{E14C6B11-9E69-4BC7-AEE0-6EC9CF20AF87}" srcOrd="5" destOrd="0" parTransId="{5C923AB1-59F2-4986-B504-004979660F31}" sibTransId="{72B24B98-2746-4468-853D-85A0838FF80C}"/>
-    <dgm:cxn modelId="{B72DAA64-6526-4D3B-A21C-06A3DE2410CA}" type="presOf" srcId="{034CED5B-B964-4238-86DE-9425E8ACB288}" destId="{914B1954-7982-4DED-A8D5-5875C703DF93}" srcOrd="0" destOrd="0" presId="urn:microsoft.com/office/officeart/2005/8/layout/process5"/>
-    <dgm:cxn modelId="{C3861FA4-D69B-4D5F-9E76-323ACFF87FEC}" srcId="{F24FA211-3F2C-4346-ABD9-092692E7A9F4}" destId="{4B3393CD-BE25-4520-B303-8BAD23F50CE0}" srcOrd="0" destOrd="0" parTransId="{9BF9F86E-19D0-4D46-B788-9E0D0EE490C8}" sibTransId="{3B76D8E7-67CF-4CB2-BF09-7B700E7E5D12}"/>
-    <dgm:cxn modelId="{5483DB64-7B33-4A70-B552-403B3D6AF22D}" type="presOf" srcId="{44E407CA-8519-439E-8A89-95F7E138FD9B}" destId="{0F9723B7-0055-459E-A10D-E0CCDB016560}" srcOrd="0" destOrd="0" presId="urn:microsoft.com/office/officeart/2005/8/layout/process5"/>
-    <dgm:cxn modelId="{05EF2D42-B22E-44CB-BCA8-0A624596CEC7}" srcId="{F24FA211-3F2C-4346-ABD9-092692E7A9F4}" destId="{16DD3F1C-A6F8-47D3-BA57-675D1A413B75}" srcOrd="2" destOrd="0" parTransId="{E5AE1A70-D04B-4C9F-9949-A16466860DE9}" sibTransId="{131BA167-16C8-427D-BB30-8989EA4E70E5}"/>
-    <dgm:cxn modelId="{62776DAB-A42C-41F2-A0ED-4C3D264A087C}" type="presOf" srcId="{E14C6B11-9E69-4BC7-AEE0-6EC9CF20AF87}" destId="{E8D2FA06-B903-4014-BFD9-BFAEAA6FFFAA}" srcOrd="0" destOrd="0" presId="urn:microsoft.com/office/officeart/2005/8/layout/process5"/>
+    <dgm:cxn modelId="{05EF2D42-B22E-44CB-BCA8-0A624596CEC7}" srcId="{F24FA211-3F2C-4346-ABD9-092692E7A9F4}" destId="{16DD3F1C-A6F8-47D3-BA57-675D1A413B75}" srcOrd="3" destOrd="0" parTransId="{E5AE1A70-D04B-4C9F-9949-A16466860DE9}" sibTransId="{131BA167-16C8-427D-BB30-8989EA4E70E5}"/>
     <dgm:cxn modelId="{60F23AFC-55AD-447C-BBBE-B07637750C9F}" type="presOf" srcId="{7703AC7D-7627-48AA-BF50-1DEDC16D7D91}" destId="{BC696920-5112-47F6-BE4D-E1EB1973835F}" srcOrd="0" destOrd="0" presId="urn:microsoft.com/office/officeart/2005/8/layout/process5"/>
-    <dgm:cxn modelId="{F7CC6D26-AE79-42FF-99C9-C166EB62A420}" type="presOf" srcId="{3B76D8E7-67CF-4CB2-BF09-7B700E7E5D12}" destId="{79A966BC-6822-4F1F-8DDB-931C03225B4B}" srcOrd="1" destOrd="0" presId="urn:microsoft.com/office/officeart/2005/8/layout/process5"/>
-    <dgm:cxn modelId="{3F059649-84A3-44AA-BD74-261B88883200}" type="presParOf" srcId="{88052538-6CB1-4F7A-A301-649AE84EF66B}" destId="{F680135F-FB83-4C06-91FC-3A29DC63396C}" srcOrd="0" destOrd="0" presId="urn:microsoft.com/office/officeart/2005/8/layout/process5"/>
-    <dgm:cxn modelId="{ACA23869-D52C-4DAF-AE06-E26C74D9D321}" type="presParOf" srcId="{88052538-6CB1-4F7A-A301-649AE84EF66B}" destId="{00C08AC9-1D4E-4798-A062-2CC79FC0B56F}" srcOrd="1" destOrd="0" presId="urn:microsoft.com/office/officeart/2005/8/layout/process5"/>
+    <dgm:cxn modelId="{FD9931FF-8238-4E2E-BC7E-638819F192A8}" type="presParOf" srcId="{88052538-6CB1-4F7A-A301-649AE84EF66B}" destId="{843FDB59-0DC6-4D62-B43C-B7DF9A235BCB}" srcOrd="0" destOrd="0" presId="urn:microsoft.com/office/officeart/2005/8/layout/process5"/>
+    <dgm:cxn modelId="{0AEBBA07-F3AE-4560-AB50-E527F5FC109A}" type="presParOf" srcId="{88052538-6CB1-4F7A-A301-649AE84EF66B}" destId="{EC4F7D31-55FD-4683-A45C-740459EB442A}" srcOrd="1" destOrd="0" presId="urn:microsoft.com/office/officeart/2005/8/layout/process5"/>
+    <dgm:cxn modelId="{E53A8130-C282-4BEE-90FD-3135942BDB54}" type="presParOf" srcId="{EC4F7D31-55FD-4683-A45C-740459EB442A}" destId="{E8880981-8A6D-4797-BEC7-23DD04C9F5DD}" srcOrd="0" destOrd="0" presId="urn:microsoft.com/office/officeart/2005/8/layout/process5"/>
+    <dgm:cxn modelId="{3F059649-84A3-44AA-BD74-261B88883200}" type="presParOf" srcId="{88052538-6CB1-4F7A-A301-649AE84EF66B}" destId="{F680135F-FB83-4C06-91FC-3A29DC63396C}" srcOrd="2" destOrd="0" presId="urn:microsoft.com/office/officeart/2005/8/layout/process5"/>
+    <dgm:cxn modelId="{ACA23869-D52C-4DAF-AE06-E26C74D9D321}" type="presParOf" srcId="{88052538-6CB1-4F7A-A301-649AE84EF66B}" destId="{00C08AC9-1D4E-4798-A062-2CC79FC0B56F}" srcOrd="3" destOrd="0" presId="urn:microsoft.com/office/officeart/2005/8/layout/process5"/>
     <dgm:cxn modelId="{A9E734BF-0A64-4EB1-B1F0-99952B24F8D4}" type="presParOf" srcId="{00C08AC9-1D4E-4798-A062-2CC79FC0B56F}" destId="{79A966BC-6822-4F1F-8DDB-931C03225B4B}" srcOrd="0" destOrd="0" presId="urn:microsoft.com/office/officeart/2005/8/layout/process5"/>
-    <dgm:cxn modelId="{F664E34C-C5E3-4E40-83FE-DFA9A7052502}" type="presParOf" srcId="{88052538-6CB1-4F7A-A301-649AE84EF66B}" destId="{BC696920-5112-47F6-BE4D-E1EB1973835F}" srcOrd="2" destOrd="0" presId="urn:microsoft.com/office/officeart/2005/8/layout/process5"/>
-    <dgm:cxn modelId="{07714460-6D80-4794-B6B5-6778D441AD03}" type="presParOf" srcId="{88052538-6CB1-4F7A-A301-649AE84EF66B}" destId="{914B1954-7982-4DED-A8D5-5875C703DF93}" srcOrd="3" destOrd="0" presId="urn:microsoft.com/office/officeart/2005/8/layout/process5"/>
+    <dgm:cxn modelId="{F664E34C-C5E3-4E40-83FE-DFA9A7052502}" type="presParOf" srcId="{88052538-6CB1-4F7A-A301-649AE84EF66B}" destId="{BC696920-5112-47F6-BE4D-E1EB1973835F}" srcOrd="4" destOrd="0" presId="urn:microsoft.com/office/officeart/2005/8/layout/process5"/>
+    <dgm:cxn modelId="{07714460-6D80-4794-B6B5-6778D441AD03}" type="presParOf" srcId="{88052538-6CB1-4F7A-A301-649AE84EF66B}" destId="{914B1954-7982-4DED-A8D5-5875C703DF93}" srcOrd="5" destOrd="0" presId="urn:microsoft.com/office/officeart/2005/8/layout/process5"/>
     <dgm:cxn modelId="{CF347C1B-03DD-42BF-A5C6-21A9FAC215D9}" type="presParOf" srcId="{914B1954-7982-4DED-A8D5-5875C703DF93}" destId="{4E7053E0-5968-423E-9BAF-BE0FE864C6C7}" srcOrd="0" destOrd="0" presId="urn:microsoft.com/office/officeart/2005/8/layout/process5"/>
-    <dgm:cxn modelId="{AA64C7A5-8A7C-4A35-B195-1B468A20B56D}" type="presParOf" srcId="{88052538-6CB1-4F7A-A301-649AE84EF66B}" destId="{5866D430-EA1C-4910-9534-06E6848714EB}" srcOrd="4" destOrd="0" presId="urn:microsoft.com/office/officeart/2005/8/layout/process5"/>
-    <dgm:cxn modelId="{06D1BAF7-2E03-4D9C-8B87-AAEC8D4B1F17}" type="presParOf" srcId="{88052538-6CB1-4F7A-A301-649AE84EF66B}" destId="{3C1528C3-2A53-4665-B9B1-9D10BDE5246C}" srcOrd="5" destOrd="0" presId="urn:microsoft.com/office/officeart/2005/8/layout/process5"/>
+    <dgm:cxn modelId="{AA64C7A5-8A7C-4A35-B195-1B468A20B56D}" type="presParOf" srcId="{88052538-6CB1-4F7A-A301-649AE84EF66B}" destId="{5866D430-EA1C-4910-9534-06E6848714EB}" srcOrd="6" destOrd="0" presId="urn:microsoft.com/office/officeart/2005/8/layout/process5"/>
+    <dgm:cxn modelId="{06D1BAF7-2E03-4D9C-8B87-AAEC8D4B1F17}" type="presParOf" srcId="{88052538-6CB1-4F7A-A301-649AE84EF66B}" destId="{3C1528C3-2A53-4665-B9B1-9D10BDE5246C}" srcOrd="7" destOrd="0" presId="urn:microsoft.com/office/officeart/2005/8/layout/process5"/>
     <dgm:cxn modelId="{FDD10865-9F91-42C3-923D-CB90B68E4B5E}" type="presParOf" srcId="{3C1528C3-2A53-4665-B9B1-9D10BDE5246C}" destId="{9834EF4A-D85A-496C-B5F4-813700D1B355}" srcOrd="0" destOrd="0" presId="urn:microsoft.com/office/officeart/2005/8/layout/process5"/>
-    <dgm:cxn modelId="{82AA983E-3686-4E80-97EE-F395C3D73F0C}" type="presParOf" srcId="{88052538-6CB1-4F7A-A301-649AE84EF66B}" destId="{9345B24A-55DC-4164-8C82-526C07E03E06}" srcOrd="6" destOrd="0" presId="urn:microsoft.com/office/officeart/2005/8/layout/process5"/>
-    <dgm:cxn modelId="{6DC4CBBC-EF07-43F2-9303-4A0B5DA82540}" type="presParOf" srcId="{88052538-6CB1-4F7A-A301-649AE84EF66B}" destId="{0F9723B7-0055-459E-A10D-E0CCDB016560}" srcOrd="7" destOrd="0" presId="urn:microsoft.com/office/officeart/2005/8/layout/process5"/>
-    <dgm:cxn modelId="{D5D63517-70E8-4F1C-BEA3-6EB2960E9170}" type="presParOf" srcId="{0F9723B7-0055-459E-A10D-E0CCDB016560}" destId="{DF43D430-0F06-4181-9E7A-3A427B6E5D03}" srcOrd="0" destOrd="0" presId="urn:microsoft.com/office/officeart/2005/8/layout/process5"/>
     <dgm:cxn modelId="{6BE192F8-F809-41ED-89F2-99B2EDB603B3}" type="presParOf" srcId="{88052538-6CB1-4F7A-A301-649AE84EF66B}" destId="{7490BDB8-F1E2-4EB2-82E7-C08F9B9E534E}" srcOrd="8" destOrd="0" presId="urn:microsoft.com/office/officeart/2005/8/layout/process5"/>
     <dgm:cxn modelId="{BF0DE5A0-CD0D-4E35-BD60-ED65579C4024}" type="presParOf" srcId="{88052538-6CB1-4F7A-A301-649AE84EF66B}" destId="{1FD05E88-9E09-4F15-B0F4-DD6A84F91FB2}" srcOrd="9" destOrd="0" presId="urn:microsoft.com/office/officeart/2005/8/layout/process5"/>
     <dgm:cxn modelId="{B58E365F-2310-49C1-A0B0-40222AC7D960}" type="presParOf" srcId="{1FD05E88-9E09-4F15-B0F4-DD6A84F91FB2}" destId="{60429F7C-10D0-4D3F-8019-997E2BE29191}" srcOrd="0" destOrd="0" presId="urn:microsoft.com/office/officeart/2005/8/layout/process5"/>
@@ -1440,15 +1411,15 @@
       <dsp:cNvGrpSpPr/>
     </dsp:nvGrpSpPr>
     <dsp:grpSpPr/>
-    <dsp:sp modelId="{F680135F-FB83-4C06-91FC-3A29DC63396C}">
+    <dsp:sp modelId="{843FDB59-0DC6-4D62-B43C-B7DF9A235BCB}">
       <dsp:nvSpPr>
         <dsp:cNvPr id="0" name=""/>
         <dsp:cNvSpPr/>
       </dsp:nvSpPr>
       <dsp:spPr>
         <a:xfrm>
-          <a:off x="0" y="316526"/>
-          <a:ext cx="2620257" cy="881121"/>
+          <a:off x="224041" y="71727"/>
+          <a:ext cx="3397741" cy="819188"/>
         </a:xfrm>
         <a:prstGeom prst="roundRect">
           <a:avLst>
@@ -1491,12 +1462,12 @@
         </a:fontRef>
       </dsp:style>
       <dsp:txBody>
-        <a:bodyPr spcFirstLastPara="0" vert="horz" wrap="square" lIns="95250" tIns="95250" rIns="95250" bIns="95250" numCol="1" spcCol="1270" anchor="ctr" anchorCtr="0">
+        <a:bodyPr spcFirstLastPara="0" vert="horz" wrap="square" lIns="106680" tIns="106680" rIns="106680" bIns="106680" numCol="1" spcCol="1270" anchor="ctr" anchorCtr="0">
           <a:noAutofit/>
         </a:bodyPr>
         <a:lstStyle/>
         <a:p>
-          <a:pPr lvl="0" algn="ctr" defTabSz="1111250">
+          <a:pPr lvl="0" algn="ctr" defTabSz="1244600">
             <a:lnSpc>
               <a:spcPct val="90000"/>
             </a:lnSpc>
@@ -1508,26 +1479,26 @@
             </a:spcAft>
           </a:pPr>
           <a:r>
-            <a:rPr lang="es-ES_tradnl" sz="2500" kern="1200" dirty="0" smtClean="0"/>
-            <a:t>bookListCtrl.js</a:t>
+            <a:rPr lang="es-ES_tradnl" sz="2800" kern="1200" smtClean="0"/>
+            <a:t>bookListPage.html</a:t>
           </a:r>
-          <a:endParaRPr lang="en-US" sz="2500" kern="1200" dirty="0"/>
+          <a:endParaRPr lang="en-US" sz="2800" kern="1200" dirty="0"/>
         </a:p>
       </dsp:txBody>
       <dsp:txXfrm>
-        <a:off x="25807" y="342333"/>
-        <a:ext cx="2568643" cy="829507"/>
+        <a:off x="248034" y="95720"/>
+        <a:ext cx="3349755" cy="771202"/>
       </dsp:txXfrm>
     </dsp:sp>
-    <dsp:sp modelId="{00C08AC9-1D4E-4798-A062-2CC79FC0B56F}">
+    <dsp:sp modelId="{EC4F7D31-55FD-4683-A45C-740459EB442A}">
       <dsp:nvSpPr>
         <dsp:cNvPr id="0" name=""/>
         <dsp:cNvSpPr/>
       </dsp:nvSpPr>
       <dsp:spPr>
-        <a:xfrm rot="21570968">
-          <a:off x="2940321" y="473313"/>
-          <a:ext cx="4769548" cy="558629"/>
+        <a:xfrm rot="15457">
+          <a:off x="4619851" y="255245"/>
+          <a:ext cx="2404492" cy="487214"/>
         </a:xfrm>
         <a:prstGeom prst="rightArrow">
           <a:avLst>
@@ -1569,7 +1540,7 @@
         </a:bodyPr>
         <a:lstStyle/>
         <a:p>
-          <a:pPr lvl="0" algn="ctr" defTabSz="800100">
+          <a:pPr lvl="0" algn="ctr" defTabSz="844550">
             <a:lnSpc>
               <a:spcPct val="90000"/>
             </a:lnSpc>
@@ -1580,51 +1551,23 @@
               <a:spcPct val="35000"/>
             </a:spcAft>
           </a:pPr>
-          <a:r>
-            <a:rPr lang="es-ES_tradnl" sz="1800" kern="1200" dirty="0" err="1" smtClean="0"/>
-            <a:t>Get</a:t>
-          </a:r>
-          <a:r>
-            <a:rPr lang="es-ES_tradnl" sz="1800" kern="1200" dirty="0" smtClean="0"/>
-            <a:t>: /</a:t>
-          </a:r>
-          <a:r>
-            <a:rPr lang="es-ES_tradnl" sz="1800" kern="1200" dirty="0" err="1" smtClean="0"/>
-            <a:t>Tpl</a:t>
-          </a:r>
-          <a:r>
-            <a:rPr lang="es-ES_tradnl" sz="1800" kern="1200" dirty="0" smtClean="0"/>
-            <a:t>/</a:t>
-          </a:r>
-          <a:r>
-            <a:rPr lang="es-ES_tradnl" sz="1800" kern="1200" dirty="0" err="1" smtClean="0"/>
-            <a:t>rest</a:t>
-          </a:r>
-          <a:r>
-            <a:rPr lang="es-ES_tradnl" sz="1800" kern="1200" dirty="0" smtClean="0"/>
-            <a:t>/</a:t>
-          </a:r>
-          <a:r>
-            <a:rPr lang="es-ES_tradnl" sz="1800" kern="1200" dirty="0" err="1" smtClean="0"/>
-            <a:t>books</a:t>
-          </a:r>
-          <a:endParaRPr lang="en-US" sz="1800" kern="1200" dirty="0"/>
+          <a:endParaRPr lang="es-AR" sz="1900" kern="1200"/>
         </a:p>
       </dsp:txBody>
       <dsp:txXfrm>
-        <a:off x="2940324" y="585747"/>
-        <a:ext cx="4601959" cy="335177"/>
+        <a:off x="4619852" y="352359"/>
+        <a:ext cx="2258328" cy="292328"/>
       </dsp:txXfrm>
     </dsp:sp>
-    <dsp:sp modelId="{BC696920-5112-47F6-BE4D-E1EB1973835F}">
+    <dsp:sp modelId="{F680135F-FB83-4C06-91FC-3A29DC63396C}">
       <dsp:nvSpPr>
         <dsp:cNvPr id="0" name=""/>
         <dsp:cNvSpPr/>
       </dsp:nvSpPr>
       <dsp:spPr>
         <a:xfrm>
-          <a:off x="7933625" y="281351"/>
-          <a:ext cx="2581974" cy="817791"/>
+          <a:off x="8158514" y="59923"/>
+          <a:ext cx="2709256" cy="911049"/>
         </a:xfrm>
         <a:prstGeom prst="roundRect">
           <a:avLst>
@@ -1667,12 +1610,12 @@
         </a:fontRef>
       </dsp:style>
       <dsp:txBody>
-        <a:bodyPr spcFirstLastPara="0" vert="horz" wrap="square" lIns="95250" tIns="95250" rIns="95250" bIns="95250" numCol="1" spcCol="1270" anchor="ctr" anchorCtr="0">
+        <a:bodyPr spcFirstLastPara="0" vert="horz" wrap="square" lIns="106680" tIns="106680" rIns="106680" bIns="106680" numCol="1" spcCol="1270" anchor="ctr" anchorCtr="0">
           <a:noAutofit/>
         </a:bodyPr>
         <a:lstStyle/>
         <a:p>
-          <a:pPr lvl="0" algn="ctr" defTabSz="1111250">
+          <a:pPr lvl="0" algn="ctr" defTabSz="1244600">
             <a:lnSpc>
               <a:spcPct val="90000"/>
             </a:lnSpc>
@@ -1684,26 +1627,26 @@
             </a:spcAft>
           </a:pPr>
           <a:r>
-            <a:rPr lang="es-ES_tradnl" sz="2500" kern="1200" dirty="0" err="1" smtClean="0"/>
-            <a:t>BookWS</a:t>
+            <a:rPr lang="es-ES_tradnl" sz="2800" kern="1200" dirty="0" smtClean="0"/>
+            <a:t>bookListCtrl.js</a:t>
           </a:r>
-          <a:endParaRPr lang="en-US" sz="2500" kern="1200" dirty="0"/>
+          <a:endParaRPr lang="en-US" sz="2800" kern="1200" dirty="0"/>
         </a:p>
       </dsp:txBody>
       <dsp:txXfrm>
-        <a:off x="7957577" y="305303"/>
-        <a:ext cx="2534070" cy="769887"/>
+        <a:off x="8185198" y="86607"/>
+        <a:ext cx="2655888" cy="857681"/>
       </dsp:txXfrm>
     </dsp:sp>
-    <dsp:sp modelId="{914B1954-7982-4DED-A8D5-5875C703DF93}">
+    <dsp:sp modelId="{00C08AC9-1D4E-4798-A062-2CC79FC0B56F}">
       <dsp:nvSpPr>
         <dsp:cNvPr id="0" name=""/>
         <dsp:cNvSpPr/>
       </dsp:nvSpPr>
       <dsp:spPr>
-        <a:xfrm rot="10070164">
-          <a:off x="2725690" y="1431329"/>
-          <a:ext cx="4945299" cy="507140"/>
+        <a:xfrm rot="9748620">
+          <a:off x="3484164" y="1453023"/>
+          <a:ext cx="4729021" cy="577604"/>
         </a:xfrm>
         <a:prstGeom prst="rightArrow">
           <a:avLst>
@@ -1745,7 +1688,7 @@
         </a:bodyPr>
         <a:lstStyle/>
         <a:p>
-          <a:pPr lvl="0" algn="ctr" defTabSz="800100">
+          <a:pPr lvl="0" algn="ctr" defTabSz="844550">
             <a:lnSpc>
               <a:spcPct val="90000"/>
             </a:lnSpc>
@@ -1757,30 +1700,50 @@
             </a:spcAft>
           </a:pPr>
           <a:r>
-            <a:rPr lang="es-ES_tradnl" sz="1800" kern="1200" dirty="0" err="1" smtClean="0"/>
-            <a:t>findAllBooks</a:t>
+            <a:rPr lang="es-ES_tradnl" sz="1900" kern="1200" dirty="0" err="1" smtClean="0"/>
+            <a:t>Get</a:t>
           </a:r>
           <a:r>
-            <a:rPr lang="es-ES_tradnl" sz="1800" kern="1200" dirty="0" smtClean="0"/>
-            <a:t>()</a:t>
+            <a:rPr lang="es-ES_tradnl" sz="1900" kern="1200" dirty="0" smtClean="0"/>
+            <a:t>: /</a:t>
           </a:r>
-          <a:endParaRPr lang="en-US" sz="1800" kern="1200" dirty="0"/>
+          <a:r>
+            <a:rPr lang="es-ES_tradnl" sz="1900" kern="1200" dirty="0" err="1" smtClean="0"/>
+            <a:t>Tpl</a:t>
+          </a:r>
+          <a:r>
+            <a:rPr lang="es-ES_tradnl" sz="1900" kern="1200" dirty="0" smtClean="0"/>
+            <a:t>/</a:t>
+          </a:r>
+          <a:r>
+            <a:rPr lang="es-ES_tradnl" sz="1900" kern="1200" dirty="0" err="1" smtClean="0"/>
+            <a:t>rest</a:t>
+          </a:r>
+          <a:r>
+            <a:rPr lang="es-ES_tradnl" sz="1900" kern="1200" dirty="0" smtClean="0"/>
+            <a:t>/</a:t>
+          </a:r>
+          <a:r>
+            <a:rPr lang="es-ES_tradnl" sz="1900" kern="1200" dirty="0" err="1" smtClean="0"/>
+            <a:t>books</a:t>
+          </a:r>
+          <a:endParaRPr lang="en-US" sz="1900" kern="1200" dirty="0"/>
         </a:p>
       </dsp:txBody>
       <dsp:txXfrm rot="10800000">
-        <a:off x="2876124" y="1516728"/>
-        <a:ext cx="4793157" cy="304284"/>
+        <a:off x="3653425" y="1542458"/>
+        <a:ext cx="4555740" cy="346562"/>
       </dsp:txXfrm>
     </dsp:sp>
-    <dsp:sp modelId="{5866D430-EA1C-4910-9534-06E6848714EB}">
+    <dsp:sp modelId="{BC696920-5112-47F6-BE4D-E1EB1973835F}">
       <dsp:nvSpPr>
         <dsp:cNvPr id="0" name=""/>
         <dsp:cNvSpPr/>
       </dsp:nvSpPr>
       <dsp:spPr>
         <a:xfrm>
-          <a:off x="0" y="1852254"/>
-          <a:ext cx="2683613" cy="1074247"/>
+          <a:off x="464907" y="2528093"/>
+          <a:ext cx="2669673" cy="845568"/>
         </a:xfrm>
         <a:prstGeom prst="roundRect">
           <a:avLst>
@@ -1823,12 +1786,12 @@
         </a:fontRef>
       </dsp:style>
       <dsp:txBody>
-        <a:bodyPr spcFirstLastPara="0" vert="horz" wrap="square" lIns="95250" tIns="95250" rIns="95250" bIns="95250" numCol="1" spcCol="1270" anchor="ctr" anchorCtr="0">
+        <a:bodyPr spcFirstLastPara="0" vert="horz" wrap="square" lIns="106680" tIns="106680" rIns="106680" bIns="106680" numCol="1" spcCol="1270" anchor="ctr" anchorCtr="0">
           <a:noAutofit/>
         </a:bodyPr>
         <a:lstStyle/>
         <a:p>
-          <a:pPr lvl="0" algn="ctr" defTabSz="1111250">
+          <a:pPr lvl="0" algn="ctr" defTabSz="1244600">
             <a:lnSpc>
               <a:spcPct val="90000"/>
             </a:lnSpc>
@@ -1840,26 +1803,26 @@
             </a:spcAft>
           </a:pPr>
           <a:r>
-            <a:rPr lang="es-ES_tradnl" sz="2500" kern="1200" dirty="0" err="1" smtClean="0"/>
-            <a:t>BookService</a:t>
+            <a:rPr lang="es-ES_tradnl" sz="2800" kern="1200" dirty="0" err="1" smtClean="0"/>
+            <a:t>BookWS</a:t>
           </a:r>
-          <a:endParaRPr lang="en-US" sz="2500" kern="1200" dirty="0"/>
+          <a:endParaRPr lang="en-US" sz="2800" kern="1200" dirty="0"/>
         </a:p>
       </dsp:txBody>
       <dsp:txXfrm>
-        <a:off x="31464" y="1883718"/>
-        <a:ext cx="2620685" cy="1011319"/>
+        <a:off x="489673" y="2552859"/>
+        <a:ext cx="2620141" cy="796036"/>
       </dsp:txXfrm>
     </dsp:sp>
-    <dsp:sp modelId="{3C1528C3-2A53-4665-B9B1-9D10BDE5246C}">
+    <dsp:sp modelId="{914B1954-7982-4DED-A8D5-5875C703DF93}">
       <dsp:nvSpPr>
         <dsp:cNvPr id="0" name=""/>
         <dsp:cNvSpPr/>
       </dsp:nvSpPr>
       <dsp:spPr>
-        <a:xfrm rot="21504203">
-          <a:off x="3193390" y="2251185"/>
-          <a:ext cx="4171887" cy="466238"/>
+        <a:xfrm rot="21576724">
+          <a:off x="3305268" y="2836306"/>
+          <a:ext cx="4200758" cy="524366"/>
         </a:xfrm>
         <a:prstGeom prst="rightArrow">
           <a:avLst>
@@ -1901,7 +1864,7 @@
         </a:bodyPr>
         <a:lstStyle/>
         <a:p>
-          <a:pPr lvl="0" algn="ctr" defTabSz="800100">
+          <a:pPr lvl="0" algn="ctr" defTabSz="844550">
             <a:lnSpc>
               <a:spcPct val="90000"/>
             </a:lnSpc>
@@ -1913,30 +1876,30 @@
             </a:spcAft>
           </a:pPr>
           <a:r>
-            <a:rPr lang="es-ES_tradnl" sz="1800" kern="1200" dirty="0" err="1" smtClean="0"/>
-            <a:t>findAll</a:t>
+            <a:rPr lang="es-ES_tradnl" sz="1900" kern="1200" dirty="0" err="1" smtClean="0"/>
+            <a:t>findAllBooks</a:t>
           </a:r>
           <a:r>
-            <a:rPr lang="es-ES_tradnl" sz="1800" kern="1200" dirty="0" smtClean="0"/>
+            <a:rPr lang="es-ES_tradnl" sz="1900" kern="1200" dirty="0" smtClean="0"/>
             <a:t>()</a:t>
           </a:r>
-          <a:endParaRPr lang="en-US" sz="1800" kern="1200" dirty="0"/>
+          <a:endParaRPr lang="en-US" sz="1900" kern="1200" dirty="0"/>
         </a:p>
       </dsp:txBody>
       <dsp:txXfrm>
-        <a:off x="3193417" y="2346382"/>
-        <a:ext cx="4032016" cy="279742"/>
+        <a:off x="3305270" y="2941712"/>
+        <a:ext cx="4043448" cy="314620"/>
       </dsp:txXfrm>
     </dsp:sp>
-    <dsp:sp modelId="{9345B24A-55DC-4164-8C82-526C07E03E06}">
+    <dsp:sp modelId="{5866D430-EA1C-4910-9534-06E6848714EB}">
       <dsp:nvSpPr>
         <dsp:cNvPr id="0" name=""/>
         <dsp:cNvSpPr/>
       </dsp:nvSpPr>
       <dsp:spPr>
         <a:xfrm>
-          <a:off x="7970364" y="1642934"/>
-          <a:ext cx="2545235" cy="1052420"/>
+          <a:off x="8183618" y="2342892"/>
+          <a:ext cx="2774765" cy="1110735"/>
         </a:xfrm>
         <a:prstGeom prst="roundRect">
           <a:avLst>
@@ -1979,12 +1942,12 @@
         </a:fontRef>
       </dsp:style>
       <dsp:txBody>
-        <a:bodyPr spcFirstLastPara="0" vert="horz" wrap="square" lIns="95250" tIns="95250" rIns="95250" bIns="95250" numCol="1" spcCol="1270" anchor="ctr" anchorCtr="0">
+        <a:bodyPr spcFirstLastPara="0" vert="horz" wrap="square" lIns="106680" tIns="106680" rIns="106680" bIns="106680" numCol="1" spcCol="1270" anchor="ctr" anchorCtr="0">
           <a:noAutofit/>
         </a:bodyPr>
         <a:lstStyle/>
         <a:p>
-          <a:pPr lvl="0" algn="ctr" defTabSz="1111250">
+          <a:pPr lvl="0" algn="ctr" defTabSz="1244600">
             <a:lnSpc>
               <a:spcPct val="90000"/>
             </a:lnSpc>
@@ -1996,26 +1959,26 @@
             </a:spcAft>
           </a:pPr>
           <a:r>
-            <a:rPr lang="es-ES_tradnl" sz="2500" kern="1200" dirty="0" err="1" smtClean="0"/>
-            <a:t>BookRepository</a:t>
+            <a:rPr lang="es-ES_tradnl" sz="2800" kern="1200" dirty="0" err="1" smtClean="0"/>
+            <a:t>BookService</a:t>
           </a:r>
-          <a:endParaRPr lang="en-US" sz="2500" kern="1200" dirty="0"/>
+          <a:endParaRPr lang="en-US" sz="2800" kern="1200" dirty="0"/>
         </a:p>
       </dsp:txBody>
       <dsp:txXfrm>
-        <a:off x="8001188" y="1673758"/>
-        <a:ext cx="2483587" cy="990772"/>
+        <a:off x="8216150" y="2375424"/>
+        <a:ext cx="2709701" cy="1045671"/>
       </dsp:txXfrm>
     </dsp:sp>
-    <dsp:sp modelId="{0F9723B7-0055-459E-A10D-E0CCDB016560}">
+    <dsp:sp modelId="{3C1528C3-2A53-4665-B9B1-9D10BDE5246C}">
       <dsp:nvSpPr>
         <dsp:cNvPr id="0" name=""/>
         <dsp:cNvSpPr/>
       </dsp:nvSpPr>
       <dsp:spPr>
-        <a:xfrm rot="10058187">
-          <a:off x="2787071" y="3011729"/>
-          <a:ext cx="4965242" cy="472643"/>
+        <a:xfrm rot="9865277">
+          <a:off x="3495640" y="3968422"/>
+          <a:ext cx="4322021" cy="482074"/>
         </a:xfrm>
         <a:prstGeom prst="rightArrow">
           <a:avLst>
@@ -2057,7 +2020,7 @@
         </a:bodyPr>
         <a:lstStyle/>
         <a:p>
-          <a:pPr lvl="0" algn="ctr" defTabSz="800100">
+          <a:pPr lvl="0" algn="ctr" defTabSz="844550">
             <a:lnSpc>
               <a:spcPct val="90000"/>
             </a:lnSpc>
@@ -2069,19 +2032,19 @@
             </a:spcAft>
           </a:pPr>
           <a:r>
-            <a:rPr lang="es-ES_tradnl" sz="1800" kern="1200" dirty="0" err="1" smtClean="0"/>
+            <a:rPr lang="es-ES_tradnl" sz="1900" kern="1200" dirty="0" err="1" smtClean="0"/>
             <a:t>findAll</a:t>
           </a:r>
           <a:r>
-            <a:rPr lang="es-ES_tradnl" sz="1800" kern="1200" dirty="0" smtClean="0"/>
+            <a:rPr lang="es-ES_tradnl" sz="1900" kern="1200" dirty="0" smtClean="0"/>
             <a:t>()</a:t>
           </a:r>
-          <a:endParaRPr lang="en-US" sz="1800" kern="1200" dirty="0"/>
+          <a:endParaRPr lang="en-US" sz="1900" kern="1200" dirty="0"/>
         </a:p>
       </dsp:txBody>
       <dsp:txXfrm rot="10800000">
-        <a:off x="2927220" y="3091078"/>
-        <a:ext cx="4823449" cy="283585"/>
+        <a:off x="3637605" y="4045417"/>
+        <a:ext cx="4177399" cy="289244"/>
       </dsp:txXfrm>
     </dsp:sp>
     <dsp:sp modelId="{7490BDB8-F1E2-4EB2-82E7-C08F9B9E534E}">
@@ -2091,8 +2054,8 @@
       </dsp:nvSpPr>
       <dsp:spPr>
         <a:xfrm>
-          <a:off x="0" y="3513640"/>
-          <a:ext cx="2491638" cy="816924"/>
+          <a:off x="329507" y="4693358"/>
+          <a:ext cx="2576269" cy="844671"/>
         </a:xfrm>
         <a:prstGeom prst="roundRect">
           <a:avLst>
@@ -2135,12 +2098,12 @@
         </a:fontRef>
       </dsp:style>
       <dsp:txBody>
-        <a:bodyPr spcFirstLastPara="0" vert="horz" wrap="square" lIns="95250" tIns="95250" rIns="95250" bIns="95250" numCol="1" spcCol="1270" anchor="ctr" anchorCtr="0">
+        <a:bodyPr spcFirstLastPara="0" vert="horz" wrap="square" lIns="106680" tIns="106680" rIns="106680" bIns="106680" numCol="1" spcCol="1270" anchor="ctr" anchorCtr="0">
           <a:noAutofit/>
         </a:bodyPr>
         <a:lstStyle/>
         <a:p>
-          <a:pPr lvl="0" algn="ctr" defTabSz="1111250">
+          <a:pPr lvl="0" algn="ctr" defTabSz="1244600">
             <a:lnSpc>
               <a:spcPct val="90000"/>
             </a:lnSpc>
@@ -2152,15 +2115,15 @@
             </a:spcAft>
           </a:pPr>
           <a:r>
-            <a:rPr lang="es-ES_tradnl" sz="2500" kern="1200" dirty="0" err="1" smtClean="0"/>
+            <a:rPr lang="es-ES_tradnl" sz="2800" kern="1200" dirty="0" err="1" smtClean="0"/>
             <a:t>BookDAO</a:t>
           </a:r>
-          <a:endParaRPr lang="en-US" sz="2500" kern="1200" dirty="0"/>
+          <a:endParaRPr lang="en-US" sz="2800" kern="1200" dirty="0"/>
         </a:p>
       </dsp:txBody>
       <dsp:txXfrm>
-        <a:off x="23927" y="3537567"/>
-        <a:ext cx="2443784" cy="769070"/>
+        <a:off x="354247" y="4718098"/>
+        <a:ext cx="2526789" cy="795191"/>
       </dsp:txXfrm>
     </dsp:sp>
     <dsp:sp modelId="{1FD05E88-9E09-4F15-B0F4-DD6A84F91FB2}">
@@ -2169,9 +2132,9 @@
         <dsp:cNvSpPr/>
       </dsp:nvSpPr>
       <dsp:spPr>
-        <a:xfrm rot="21563699">
-          <a:off x="3447939" y="3841071"/>
-          <a:ext cx="3981645" cy="478478"/>
+        <a:xfrm rot="20117">
+          <a:off x="3816975" y="5096657"/>
+          <a:ext cx="3793452" cy="494730"/>
         </a:xfrm>
         <a:prstGeom prst="rightArrow">
           <a:avLst>
@@ -2213,7 +2176,7 @@
         </a:bodyPr>
         <a:lstStyle/>
         <a:p>
-          <a:pPr lvl="0" algn="ctr" defTabSz="800100">
+          <a:pPr lvl="0" algn="ctr" defTabSz="844550">
             <a:lnSpc>
               <a:spcPct val="90000"/>
             </a:lnSpc>
@@ -2225,19 +2188,19 @@
             </a:spcAft>
           </a:pPr>
           <a:r>
-            <a:rPr lang="es-ES_tradnl" sz="1800" kern="1200" dirty="0" smtClean="0"/>
+            <a:rPr lang="es-ES_tradnl" sz="1900" kern="1200" dirty="0" smtClean="0"/>
             <a:t>SELECT * FROM </a:t>
           </a:r>
           <a:r>
-            <a:rPr lang="es-ES_tradnl" sz="1800" kern="1200" dirty="0" err="1" smtClean="0"/>
+            <a:rPr lang="es-ES_tradnl" sz="1900" kern="1200" dirty="0" err="1" smtClean="0"/>
             <a:t>books</a:t>
           </a:r>
-          <a:endParaRPr lang="en-US" sz="1800" kern="1200" dirty="0"/>
+          <a:endParaRPr lang="en-US" sz="1900" kern="1200" dirty="0"/>
         </a:p>
       </dsp:txBody>
       <dsp:txXfrm>
-        <a:off x="3447943" y="3937525"/>
-        <a:ext cx="3838102" cy="287086"/>
+        <a:off x="3816976" y="5195169"/>
+        <a:ext cx="3645033" cy="296838"/>
       </dsp:txXfrm>
     </dsp:sp>
     <dsp:sp modelId="{E8D2FA06-B903-4014-BFD9-BFAEAA6FFFAA}">
@@ -2247,8 +2210,8 @@
       </dsp:nvSpPr>
       <dsp:spPr>
         <a:xfrm>
-          <a:off x="7942629" y="3331881"/>
-          <a:ext cx="2547897" cy="1012100"/>
+          <a:off x="8099326" y="4638094"/>
+          <a:ext cx="2634438" cy="1046477"/>
         </a:xfrm>
         <a:prstGeom prst="roundRect">
           <a:avLst>
@@ -2291,12 +2254,12 @@
         </a:fontRef>
       </dsp:style>
       <dsp:txBody>
-        <a:bodyPr spcFirstLastPara="0" vert="horz" wrap="square" lIns="95250" tIns="95250" rIns="95250" bIns="95250" numCol="1" spcCol="1270" anchor="ctr" anchorCtr="0">
+        <a:bodyPr spcFirstLastPara="0" vert="horz" wrap="square" lIns="106680" tIns="106680" rIns="106680" bIns="106680" numCol="1" spcCol="1270" anchor="ctr" anchorCtr="0">
           <a:noAutofit/>
         </a:bodyPr>
         <a:lstStyle/>
         <a:p>
-          <a:pPr lvl="0" algn="ctr" defTabSz="1111250">
+          <a:pPr lvl="0" algn="ctr" defTabSz="1244600">
             <a:lnSpc>
               <a:spcPct val="90000"/>
             </a:lnSpc>
@@ -2308,15 +2271,15 @@
             </a:spcAft>
           </a:pPr>
           <a:r>
-            <a:rPr lang="es-ES_tradnl" sz="2500" kern="1200" dirty="0" smtClean="0"/>
+            <a:rPr lang="es-ES_tradnl" sz="2800" kern="1200" dirty="0" smtClean="0"/>
             <a:t>BASE DE DATOS</a:t>
           </a:r>
-          <a:endParaRPr lang="en-US" sz="2500" kern="1200" dirty="0"/>
+          <a:endParaRPr lang="en-US" sz="2800" kern="1200" dirty="0"/>
         </a:p>
       </dsp:txBody>
       <dsp:txXfrm>
-        <a:off x="7972272" y="3361524"/>
-        <a:ext cx="2488611" cy="952814"/>
+        <a:off x="8129976" y="4668744"/>
+        <a:ext cx="2573138" cy="985177"/>
       </dsp:txXfrm>
     </dsp:sp>
   </dsp:spTree>
@@ -6224,7 +6187,7 @@
           <a:p>
             <a:fld id="{0E53D8F8-7794-4C5C-9B96-6B70F6BB9983}" type="datetimeFigureOut">
               <a:rPr lang="en-US" smtClean="0"/>
-              <a:t>10/20/2014</a:t>
+              <a:t>10/21/2014</a:t>
             </a:fld>
             <a:endParaRPr lang="en-US"/>
           </a:p>
@@ -11512,7 +11475,21 @@
             </a:r>
             <a:r>
               <a:rPr lang="es-AR" dirty="0" smtClean="0"/>
-              <a:t>, un Framework que permite desarrollar la aplicación web de una manera mucho más rápida, intuitiva, sencilla y ¡adaptable! y que además permite poder hacer crecer y mejorar el diseño a medida que se va desarrollando la aplicación.</a:t>
+              <a:t>, un Framework que permite desarrollar la aplicación web de una manera mucho más rápida, intuitiva, sencilla y ¡adaptable! y que además permite poder hacer crecer y mejorar el diseño a medida que se va desarrollando la </a:t>
+            </a:r>
+            <a:r>
+              <a:rPr lang="es-AR" smtClean="0"/>
+              <a:t>aplicación</a:t>
+            </a:r>
+            <a:r>
+              <a:rPr lang="es-AR" smtClean="0"/>
+              <a:t>.</a:t>
+            </a:r>
+          </a:p>
+          <a:p>
+            <a:r>
+              <a:rPr lang="es-AR" smtClean="0"/>
+              <a:t>Como valor agregado, los componentes de Bootstrap son "responsive", lo que significa que se adaptan según las dimensiones de la pantalla del dispositivo, tanto en tamaño, ubicación y funcionamiento.</a:t>
             </a:r>
             <a:endParaRPr lang="es-AR" dirty="0"/>
           </a:p>
@@ -11615,24 +11592,24 @@
           <a:lstStyle/>
           <a:p>
             <a:r>
+              <a:rPr lang="es-AR" smtClean="0"/>
+              <a:t>JSON </a:t>
+            </a:r>
+            <a:r>
               <a:rPr lang="es-AR" dirty="0" smtClean="0"/>
-              <a:t>El navegador solo puede pasar texto por la “</a:t>
-            </a:r>
-            <a:r>
-              <a:rPr lang="es-AR" dirty="0" err="1" smtClean="0"/>
-              <a:t>Query</a:t>
+              <a:t>es una </a:t>
+            </a:r>
+            <a:r>
+              <a:rPr lang="es-AR" smtClean="0"/>
+              <a:t>forma </a:t>
+            </a:r>
+            <a:r>
+              <a:rPr lang="es-AR" smtClean="0"/>
+              <a:t>standard de </a:t>
             </a:r>
             <a:r>
               <a:rPr lang="es-AR" dirty="0" smtClean="0"/>
-              <a:t> </a:t>
-            </a:r>
-            <a:r>
-              <a:rPr lang="es-AR" dirty="0" err="1" smtClean="0"/>
-              <a:t>String</a:t>
-            </a:r>
-            <a:r>
-              <a:rPr lang="es-AR" dirty="0" smtClean="0"/>
-              <a:t>”, pero del lado de Java manejamos objetos complejos. JSON es una forma de describir objetos en una cadena de texto plano, de manera que su información pueda ser recuperada fácilmente utilizando un “</a:t>
+              <a:t>describir objetos en una cadena de texto plano, de manera que su información pueda ser recuperada fácilmente utilizando un “</a:t>
             </a:r>
             <a:r>
               <a:rPr lang="es-AR" dirty="0" err="1" smtClean="0"/>
@@ -11862,14 +11839,17 @@
           <a:lstStyle/>
           <a:p>
             <a:r>
+              <a:rPr lang="es-AR" smtClean="0"/>
+              <a:t>Es </a:t>
+            </a:r>
+            <a:r>
+              <a:rPr lang="es-AR" smtClean="0"/>
+              <a:t>un estilo de arquitectura, </a:t>
+            </a:r>
+            <a:r>
               <a:rPr lang="es-AR" dirty="0" smtClean="0"/>
-              <a:t>Es una arquitectura </a:t>
-            </a:r>
-            <a:r>
-              <a:rPr lang="es-AR" dirty="0" smtClean="0"/>
-              <a:t>web, no un protocolo.</a:t>
-            </a:r>
-            <a:endParaRPr lang="es-AR" dirty="0" smtClean="0"/>
+              <a:t>no un protocolo.</a:t>
+            </a:r>
           </a:p>
           <a:p>
             <a:r>
@@ -11906,22 +11886,55 @@
             </a:r>
             <a:r>
               <a:rPr lang="es-AR" dirty="0" smtClean="0"/>
-              <a:t>) y HHTP </a:t>
-            </a:r>
-            <a:r>
-              <a:rPr lang="es-AR" dirty="0" err="1" smtClean="0"/>
-              <a:t>request</a:t>
+              <a:t>) </a:t>
+            </a:r>
+            <a:r>
+              <a:rPr lang="es-AR" smtClean="0"/>
+              <a:t>y </a:t>
+            </a:r>
+            <a:r>
+              <a:rPr lang="es-AR" smtClean="0"/>
+              <a:t>requests HTTP </a:t>
+            </a:r>
+            <a:r>
+              <a:rPr lang="es-AR" smtClean="0"/>
+              <a:t>(</a:t>
+            </a:r>
+            <a:r>
+              <a:rPr lang="es-AR" smtClean="0"/>
+              <a:t>GET, POST, PUT, </a:t>
             </a:r>
             <a:r>
               <a:rPr lang="es-AR" dirty="0" smtClean="0"/>
-              <a:t> (GET POST PUT DELETE).</a:t>
+              <a:t>DELETE).</a:t>
             </a:r>
           </a:p>
           <a:p>
             <a:r>
               <a:rPr lang="es-AR" dirty="0" smtClean="0"/>
-              <a:t>El estado del cliente y la transacción se almacena del lado del cliente, el servidor no persiste información de los clientes (no es necesario, aunque puede hacerlo).</a:t>
-            </a:r>
+              <a:t>El estado del cliente y la transacción se almacena del lado del cliente, el servidor </a:t>
+            </a:r>
+            <a:r>
+              <a:rPr lang="es-AR" smtClean="0"/>
+              <a:t>no </a:t>
+            </a:r>
+            <a:r>
+              <a:rPr lang="es-AR" smtClean="0"/>
+              <a:t>mantiene </a:t>
+            </a:r>
+            <a:r>
+              <a:rPr lang="es-AR" dirty="0" smtClean="0"/>
+              <a:t>información de los </a:t>
+            </a:r>
+            <a:r>
+              <a:rPr lang="es-AR" smtClean="0"/>
+              <a:t>clientes </a:t>
+            </a:r>
+            <a:r>
+              <a:rPr lang="es-AR" smtClean="0"/>
+              <a:t>en memoria.</a:t>
+            </a:r>
+            <a:endParaRPr lang="es-AR" dirty="0" smtClean="0"/>
           </a:p>
           <a:p>
             <a:r>
@@ -12054,7 +12067,39 @@
           <a:p>
             <a:r>
               <a:rPr lang="es-AR" dirty="0" smtClean="0"/>
-              <a:t>Cuando queremos almacenar objetos en las bases de datos nos encontramos con una limitación: las bases de datos almacenan datos primitivos en tablas y los objetos pueden contener otros objetos lo cual los hace complejos. Los </a:t>
+              <a:t>Cuando queremos almacenar objetos en las bases de datos nos encontramos </a:t>
+            </a:r>
+            <a:r>
+              <a:rPr lang="es-AR" smtClean="0"/>
+              <a:t>con </a:t>
+            </a:r>
+            <a:r>
+              <a:rPr lang="es-AR" smtClean="0"/>
+              <a:t>varias limitaciónes: </a:t>
+            </a:r>
+            <a:r>
+              <a:rPr lang="es-AR" dirty="0" smtClean="0"/>
+              <a:t>las bases de </a:t>
+            </a:r>
+            <a:r>
+              <a:rPr lang="es-AR" smtClean="0"/>
+              <a:t>datos </a:t>
+            </a:r>
+            <a:r>
+              <a:rPr lang="es-AR" smtClean="0"/>
+              <a:t>se basan en algebra relacional </a:t>
+            </a:r>
+            <a:r>
+              <a:rPr lang="es-AR" smtClean="0"/>
+              <a:t>y </a:t>
+            </a:r>
+            <a:r>
+              <a:rPr lang="es-AR" smtClean="0"/>
+              <a:t>el modelo de la aplicación esta orientado a objetos. </a:t>
+            </a:r>
+            <a:r>
+              <a:rPr lang="es-AR" dirty="0" smtClean="0"/>
+              <a:t>Los </a:t>
             </a:r>
             <a:r>
               <a:rPr lang="es-AR" dirty="0" err="1" smtClean="0"/>
@@ -12282,6 +12327,42 @@
           <a:chExt cx="0" cy="0"/>
         </a:xfrm>
       </p:grpSpPr>
+      <p:cxnSp>
+        <p:nvCxnSpPr>
+          <p:cNvPr id="8" name="Straight Connector 7"/>
+          <p:cNvCxnSpPr/>
+          <p:nvPr/>
+        </p:nvCxnSpPr>
+        <p:spPr>
+          <a:xfrm flipV="1">
+            <a:off x="526092" y="2561968"/>
+            <a:ext cx="11344632" cy="8237"/>
+          </a:xfrm>
+          <a:prstGeom prst="line">
+            <a:avLst/>
+          </a:prstGeom>
+          <a:ln w="38100">
+            <a:solidFill>
+              <a:schemeClr val="tx1"/>
+            </a:solidFill>
+            <a:prstDash val="dash"/>
+          </a:ln>
+        </p:spPr>
+        <p:style>
+          <a:lnRef idx="1">
+            <a:schemeClr val="accent1"/>
+          </a:lnRef>
+          <a:fillRef idx="0">
+            <a:schemeClr val="accent1"/>
+          </a:fillRef>
+          <a:effectRef idx="0">
+            <a:schemeClr val="accent1"/>
+          </a:effectRef>
+          <a:fontRef idx="minor">
+            <a:schemeClr val="tx1"/>
+          </a:fontRef>
+        </p:style>
+      </p:cxnSp>
       <p:sp>
         <p:nvSpPr>
           <p:cNvPr id="2" name="Title 1"/>
@@ -12320,14 +12401,14 @@
             <p:ph idx="1"/>
             <p:extLst>
               <p:ext uri="{D42A27DB-BD31-4B8C-83A1-F6EECF244321}">
-                <p14:modId xmlns:p14="http://schemas.microsoft.com/office/powerpoint/2010/main" val="1667295645"/>
+                <p14:modId xmlns:p14="http://schemas.microsoft.com/office/powerpoint/2010/main" val="3337130036"/>
               </p:ext>
             </p:extLst>
           </p:nvPr>
         </p:nvGraphicFramePr>
         <p:xfrm>
-          <a:off x="838200" y="2344615"/>
-          <a:ext cx="10515600" cy="5427785"/>
+          <a:off x="838200" y="881450"/>
+          <a:ext cx="10958384" cy="5791200"/>
         </p:xfrm>
         <a:graphic>
           <a:graphicData uri="http://schemas.openxmlformats.org/drawingml/2006/diagram">
@@ -12337,93 +12418,27 @@
       </p:graphicFrame>
       <p:sp>
         <p:nvSpPr>
-          <p:cNvPr id="3" name="Rounded Rectangle 2"/>
-          <p:cNvSpPr/>
+          <p:cNvPr id="6" name="TextBox 5"/>
+          <p:cNvSpPr txBox="1"/>
           <p:nvPr/>
         </p:nvSpPr>
         <p:spPr>
           <a:xfrm>
-            <a:off x="526092" y="1089764"/>
-            <a:ext cx="3294345" cy="926605"/>
-          </a:xfrm>
-          <a:prstGeom prst="roundRect">
+            <a:off x="2059459" y="2899719"/>
+            <a:ext cx="184731" cy="369332"/>
+          </a:xfrm>
+          <a:prstGeom prst="rect">
             <a:avLst/>
           </a:prstGeom>
-        </p:spPr>
-        <p:style>
-          <a:lnRef idx="2">
-            <a:schemeClr val="accent1">
-              <a:shade val="50000"/>
-            </a:schemeClr>
-          </a:lnRef>
-          <a:fillRef idx="1">
-            <a:schemeClr val="accent1"/>
-          </a:fillRef>
-          <a:effectRef idx="0">
-            <a:schemeClr val="accent1"/>
-          </a:effectRef>
-          <a:fontRef idx="minor">
-            <a:schemeClr val="lt1"/>
-          </a:fontRef>
-        </p:style>
+          <a:noFill/>
+        </p:spPr>
         <p:txBody>
-          <a:bodyPr rtlCol="0" anchor="ctr"/>
+          <a:bodyPr wrap="none" rtlCol="0">
+            <a:spAutoFit/>
+          </a:bodyPr>
           <a:lstStyle/>
           <a:p>
-            <a:pPr algn="ctr"/>
-            <a:r>
-              <a:rPr lang="es-ES_tradnl" sz="2700" dirty="0" smtClean="0"/>
-              <a:t>bookListPage.html</a:t>
-            </a:r>
-            <a:endParaRPr lang="en-US" sz="2700" dirty="0"/>
-          </a:p>
-        </p:txBody>
-      </p:sp>
-      <p:sp>
-        <p:nvSpPr>
-          <p:cNvPr id="5" name="Down Arrow 4"/>
-          <p:cNvSpPr/>
-          <p:nvPr/>
-        </p:nvSpPr>
-        <p:spPr>
-          <a:xfrm>
-            <a:off x="1998784" y="2086707"/>
-            <a:ext cx="351693" cy="539262"/>
-          </a:xfrm>
-          <a:prstGeom prst="downArrow">
-            <a:avLst/>
-          </a:prstGeom>
-          <a:solidFill>
-            <a:srgbClr val="B5CBE7"/>
-          </a:solidFill>
-          <a:ln>
-            <a:solidFill>
-              <a:srgbClr val="B5CBE7"/>
-            </a:solidFill>
-          </a:ln>
-        </p:spPr>
-        <p:style>
-          <a:lnRef idx="2">
-            <a:schemeClr val="accent1">
-              <a:shade val="50000"/>
-            </a:schemeClr>
-          </a:lnRef>
-          <a:fillRef idx="1">
-            <a:schemeClr val="accent1"/>
-          </a:fillRef>
-          <a:effectRef idx="0">
-            <a:schemeClr val="accent1"/>
-          </a:effectRef>
-          <a:fontRef idx="minor">
-            <a:schemeClr val="lt1"/>
-          </a:fontRef>
-        </p:style>
-        <p:txBody>
-          <a:bodyPr rtlCol="0" anchor="ctr"/>
-          <a:lstStyle/>
-          <a:p>
-            <a:pPr algn="ctr"/>
-            <a:endParaRPr lang="en-US"/>
+            <a:endParaRPr lang="es-AR"/>
           </a:p>
         </p:txBody>
       </p:sp>

</xml_diff>